<commit_message>
tweaked presentation and readme
</commit_message>
<xml_diff>
--- a/deliverables/w205_section04_final_project_james_weixing_annalaissa_yang.pptx
+++ b/deliverables/w205_section04_final_project_james_weixing_annalaissa_yang.pptx
@@ -5,10 +5,10 @@
     <p:sldMasterId id="2147483912" r:id="rId2"/>
   </p:sldMasterIdLst>
   <p:notesMasterIdLst>
-    <p:notesMasterId r:id="rId11"/>
+    <p:notesMasterId r:id="rId13"/>
   </p:notesMasterIdLst>
   <p:handoutMasterIdLst>
-    <p:handoutMasterId r:id="rId12"/>
+    <p:handoutMasterId r:id="rId14"/>
   </p:handoutMasterIdLst>
   <p:sldIdLst>
     <p:sldId id="256" r:id="rId3"/>
@@ -17,8 +17,10 @@
     <p:sldId id="274" r:id="rId6"/>
     <p:sldId id="280" r:id="rId7"/>
     <p:sldId id="279" r:id="rId8"/>
-    <p:sldId id="278" r:id="rId9"/>
-    <p:sldId id="277" r:id="rId10"/>
+    <p:sldId id="281" r:id="rId9"/>
+    <p:sldId id="282" r:id="rId10"/>
+    <p:sldId id="278" r:id="rId11"/>
+    <p:sldId id="277" r:id="rId12"/>
   </p:sldIdLst>
   <p:sldSz cx="12188825" cy="6858000"/>
   <p:notesSz cx="6858000" cy="9144000"/>
@@ -1421,7 +1423,7 @@
   <dgm:whole/>
   <dgm:extLst>
     <a:ext uri="http://schemas.microsoft.com/office/drawing/2008/diagram">
-      <dsp:dataModelExt xmlns:dsp="http://schemas.microsoft.com/office/drawing/2008/diagram" relId="rId6" minVer="http://schemas.openxmlformats.org/drawingml/2006/diagram"/>
+      <dsp:dataModelExt xmlns:dsp="http://schemas.microsoft.com/office/drawing/2008/diagram" relId="rId7" minVer="http://schemas.openxmlformats.org/drawingml/2006/diagram"/>
     </a:ext>
   </dgm:extLst>
 </dgm:dataModel>
@@ -3849,6 +3851,823 @@
 </p:notesMaster>
 </file>
 
+<file path=ppt/notesSlides/notesSlide1.xml><?xml version="1.0" encoding="utf-8"?>
+<p:notes xmlns:a="http://schemas.openxmlformats.org/drawingml/2006/main" xmlns:r="http://schemas.openxmlformats.org/officeDocument/2006/relationships" xmlns:p="http://schemas.openxmlformats.org/presentationml/2006/main">
+  <p:cSld>
+    <p:spTree>
+      <p:nvGrpSpPr>
+        <p:cNvPr id="1" name=""/>
+        <p:cNvGrpSpPr/>
+        <p:nvPr/>
+      </p:nvGrpSpPr>
+      <p:grpSpPr>
+        <a:xfrm>
+          <a:off x="0" y="0"/>
+          <a:ext cx="0" cy="0"/>
+          <a:chOff x="0" y="0"/>
+          <a:chExt cx="0" cy="0"/>
+        </a:xfrm>
+      </p:grpSpPr>
+      <p:sp>
+        <p:nvSpPr>
+          <p:cNvPr id="2" name="Slide Image Placeholder 1"/>
+          <p:cNvSpPr>
+            <a:spLocks noGrp="1" noRot="1" noChangeAspect="1"/>
+          </p:cNvSpPr>
+          <p:nvPr>
+            <p:ph type="sldImg"/>
+          </p:nvPr>
+        </p:nvSpPr>
+        <p:spPr/>
+      </p:sp>
+      <p:sp>
+        <p:nvSpPr>
+          <p:cNvPr id="3" name="Notes Placeholder 2"/>
+          <p:cNvSpPr>
+            <a:spLocks noGrp="1"/>
+          </p:cNvSpPr>
+          <p:nvPr>
+            <p:ph type="body" idx="1"/>
+          </p:nvPr>
+        </p:nvSpPr>
+        <p:spPr/>
+        <p:txBody>
+          <a:bodyPr/>
+          <a:lstStyle/>
+          <a:p>
+            <a:r>
+              <a:rPr lang="en-US" dirty="0"/>
+              <a:t>YYQ</a:t>
+            </a:r>
+          </a:p>
+        </p:txBody>
+      </p:sp>
+      <p:sp>
+        <p:nvSpPr>
+          <p:cNvPr id="4" name="Slide Number Placeholder 3"/>
+          <p:cNvSpPr>
+            <a:spLocks noGrp="1"/>
+          </p:cNvSpPr>
+          <p:nvPr>
+            <p:ph type="sldNum" sz="quarter" idx="10"/>
+          </p:nvPr>
+        </p:nvSpPr>
+        <p:spPr/>
+        <p:txBody>
+          <a:bodyPr/>
+          <a:lstStyle/>
+          <a:p>
+            <a:fld id="{BF105DB2-FD3E-441D-8B7E-7AE83ECE27B3}" type="slidenum">
+              <a:rPr lang="en-US" smtClean="0"/>
+              <a:t>1</a:t>
+            </a:fld>
+            <a:endParaRPr lang="en-US"/>
+          </a:p>
+        </p:txBody>
+      </p:sp>
+    </p:spTree>
+    <p:extLst>
+      <p:ext uri="{BB962C8B-B14F-4D97-AF65-F5344CB8AC3E}">
+        <p14:creationId xmlns:p14="http://schemas.microsoft.com/office/powerpoint/2010/main" val="2731055741"/>
+      </p:ext>
+    </p:extLst>
+  </p:cSld>
+  <p:clrMapOvr>
+    <a:masterClrMapping/>
+  </p:clrMapOvr>
+</p:notes>
+</file>
+
+<file path=ppt/notesSlides/notesSlide2.xml><?xml version="1.0" encoding="utf-8"?>
+<p:notes xmlns:a="http://schemas.openxmlformats.org/drawingml/2006/main" xmlns:r="http://schemas.openxmlformats.org/officeDocument/2006/relationships" xmlns:p="http://schemas.openxmlformats.org/presentationml/2006/main">
+  <p:cSld>
+    <p:spTree>
+      <p:nvGrpSpPr>
+        <p:cNvPr id="1" name=""/>
+        <p:cNvGrpSpPr/>
+        <p:nvPr/>
+      </p:nvGrpSpPr>
+      <p:grpSpPr>
+        <a:xfrm>
+          <a:off x="0" y="0"/>
+          <a:ext cx="0" cy="0"/>
+          <a:chOff x="0" y="0"/>
+          <a:chExt cx="0" cy="0"/>
+        </a:xfrm>
+      </p:grpSpPr>
+      <p:sp>
+        <p:nvSpPr>
+          <p:cNvPr id="2" name="Slide Image Placeholder 1"/>
+          <p:cNvSpPr>
+            <a:spLocks noGrp="1" noRot="1" noChangeAspect="1"/>
+          </p:cNvSpPr>
+          <p:nvPr>
+            <p:ph type="sldImg"/>
+          </p:nvPr>
+        </p:nvSpPr>
+        <p:spPr/>
+      </p:sp>
+      <p:sp>
+        <p:nvSpPr>
+          <p:cNvPr id="3" name="Notes Placeholder 2"/>
+          <p:cNvSpPr>
+            <a:spLocks noGrp="1"/>
+          </p:cNvSpPr>
+          <p:nvPr>
+            <p:ph type="body" idx="1"/>
+          </p:nvPr>
+        </p:nvSpPr>
+        <p:spPr/>
+        <p:txBody>
+          <a:bodyPr/>
+          <a:lstStyle/>
+          <a:p>
+            <a:r>
+              <a:rPr lang="en-US" dirty="0"/>
+              <a:t>YYQ</a:t>
+            </a:r>
+          </a:p>
+        </p:txBody>
+      </p:sp>
+      <p:sp>
+        <p:nvSpPr>
+          <p:cNvPr id="4" name="Slide Number Placeholder 3"/>
+          <p:cNvSpPr>
+            <a:spLocks noGrp="1"/>
+          </p:cNvSpPr>
+          <p:nvPr>
+            <p:ph type="sldNum" sz="quarter" idx="10"/>
+          </p:nvPr>
+        </p:nvSpPr>
+        <p:spPr/>
+        <p:txBody>
+          <a:bodyPr/>
+          <a:lstStyle/>
+          <a:p>
+            <a:fld id="{BF105DB2-FD3E-441D-8B7E-7AE83ECE27B3}" type="slidenum">
+              <a:rPr lang="en-US" smtClean="0"/>
+              <a:t>2</a:t>
+            </a:fld>
+            <a:endParaRPr lang="en-US"/>
+          </a:p>
+        </p:txBody>
+      </p:sp>
+    </p:spTree>
+    <p:extLst>
+      <p:ext uri="{BB962C8B-B14F-4D97-AF65-F5344CB8AC3E}">
+        <p14:creationId xmlns:p14="http://schemas.microsoft.com/office/powerpoint/2010/main" val="1647233677"/>
+      </p:ext>
+    </p:extLst>
+  </p:cSld>
+  <p:clrMapOvr>
+    <a:masterClrMapping/>
+  </p:clrMapOvr>
+</p:notes>
+</file>
+
+<file path=ppt/notesSlides/notesSlide3.xml><?xml version="1.0" encoding="utf-8"?>
+<p:notes xmlns:a="http://schemas.openxmlformats.org/drawingml/2006/main" xmlns:r="http://schemas.openxmlformats.org/officeDocument/2006/relationships" xmlns:p="http://schemas.openxmlformats.org/presentationml/2006/main">
+  <p:cSld>
+    <p:spTree>
+      <p:nvGrpSpPr>
+        <p:cNvPr id="1" name=""/>
+        <p:cNvGrpSpPr/>
+        <p:nvPr/>
+      </p:nvGrpSpPr>
+      <p:grpSpPr>
+        <a:xfrm>
+          <a:off x="0" y="0"/>
+          <a:ext cx="0" cy="0"/>
+          <a:chOff x="0" y="0"/>
+          <a:chExt cx="0" cy="0"/>
+        </a:xfrm>
+      </p:grpSpPr>
+      <p:sp>
+        <p:nvSpPr>
+          <p:cNvPr id="2" name="Slide Image Placeholder 1"/>
+          <p:cNvSpPr>
+            <a:spLocks noGrp="1" noRot="1" noChangeAspect="1"/>
+          </p:cNvSpPr>
+          <p:nvPr>
+            <p:ph type="sldImg"/>
+          </p:nvPr>
+        </p:nvSpPr>
+        <p:spPr/>
+      </p:sp>
+      <p:sp>
+        <p:nvSpPr>
+          <p:cNvPr id="3" name="Notes Placeholder 2"/>
+          <p:cNvSpPr>
+            <a:spLocks noGrp="1"/>
+          </p:cNvSpPr>
+          <p:nvPr>
+            <p:ph type="body" idx="1"/>
+          </p:nvPr>
+        </p:nvSpPr>
+        <p:spPr/>
+        <p:txBody>
+          <a:bodyPr/>
+          <a:lstStyle/>
+          <a:p>
+            <a:r>
+              <a:rPr lang="en-US" dirty="0"/>
+              <a:t>YYQ</a:t>
+            </a:r>
+          </a:p>
+        </p:txBody>
+      </p:sp>
+      <p:sp>
+        <p:nvSpPr>
+          <p:cNvPr id="4" name="Slide Number Placeholder 3"/>
+          <p:cNvSpPr>
+            <a:spLocks noGrp="1"/>
+          </p:cNvSpPr>
+          <p:nvPr>
+            <p:ph type="sldNum" sz="quarter" idx="10"/>
+          </p:nvPr>
+        </p:nvSpPr>
+        <p:spPr/>
+        <p:txBody>
+          <a:bodyPr/>
+          <a:lstStyle/>
+          <a:p>
+            <a:fld id="{BF105DB2-FD3E-441D-8B7E-7AE83ECE27B3}" type="slidenum">
+              <a:rPr lang="en-US" smtClean="0"/>
+              <a:t>3</a:t>
+            </a:fld>
+            <a:endParaRPr lang="en-US"/>
+          </a:p>
+        </p:txBody>
+      </p:sp>
+    </p:spTree>
+    <p:extLst>
+      <p:ext uri="{BB962C8B-B14F-4D97-AF65-F5344CB8AC3E}">
+        <p14:creationId xmlns:p14="http://schemas.microsoft.com/office/powerpoint/2010/main" val="1002627890"/>
+      </p:ext>
+    </p:extLst>
+  </p:cSld>
+  <p:clrMapOvr>
+    <a:masterClrMapping/>
+  </p:clrMapOvr>
+</p:notes>
+</file>
+
+<file path=ppt/notesSlides/notesSlide4.xml><?xml version="1.0" encoding="utf-8"?>
+<p:notes xmlns:a="http://schemas.openxmlformats.org/drawingml/2006/main" xmlns:r="http://schemas.openxmlformats.org/officeDocument/2006/relationships" xmlns:p="http://schemas.openxmlformats.org/presentationml/2006/main">
+  <p:cSld>
+    <p:spTree>
+      <p:nvGrpSpPr>
+        <p:cNvPr id="1" name=""/>
+        <p:cNvGrpSpPr/>
+        <p:nvPr/>
+      </p:nvGrpSpPr>
+      <p:grpSpPr>
+        <a:xfrm>
+          <a:off x="0" y="0"/>
+          <a:ext cx="0" cy="0"/>
+          <a:chOff x="0" y="0"/>
+          <a:chExt cx="0" cy="0"/>
+        </a:xfrm>
+      </p:grpSpPr>
+      <p:sp>
+        <p:nvSpPr>
+          <p:cNvPr id="2" name="Slide Image Placeholder 1"/>
+          <p:cNvSpPr>
+            <a:spLocks noGrp="1" noRot="1" noChangeAspect="1"/>
+          </p:cNvSpPr>
+          <p:nvPr>
+            <p:ph type="sldImg"/>
+          </p:nvPr>
+        </p:nvSpPr>
+        <p:spPr/>
+      </p:sp>
+      <p:sp>
+        <p:nvSpPr>
+          <p:cNvPr id="3" name="Notes Placeholder 2"/>
+          <p:cNvSpPr>
+            <a:spLocks noGrp="1"/>
+          </p:cNvSpPr>
+          <p:nvPr>
+            <p:ph type="body" idx="1"/>
+          </p:nvPr>
+        </p:nvSpPr>
+        <p:spPr/>
+        <p:txBody>
+          <a:bodyPr/>
+          <a:lstStyle/>
+          <a:p>
+            <a:r>
+              <a:rPr lang="en-US" dirty="0"/>
+              <a:t>YYQ</a:t>
+            </a:r>
+          </a:p>
+        </p:txBody>
+      </p:sp>
+      <p:sp>
+        <p:nvSpPr>
+          <p:cNvPr id="4" name="Slide Number Placeholder 3"/>
+          <p:cNvSpPr>
+            <a:spLocks noGrp="1"/>
+          </p:cNvSpPr>
+          <p:nvPr>
+            <p:ph type="sldNum" sz="quarter" idx="10"/>
+          </p:nvPr>
+        </p:nvSpPr>
+        <p:spPr/>
+        <p:txBody>
+          <a:bodyPr/>
+          <a:lstStyle/>
+          <a:p>
+            <a:fld id="{BF105DB2-FD3E-441D-8B7E-7AE83ECE27B3}" type="slidenum">
+              <a:rPr lang="en-US" smtClean="0"/>
+              <a:t>4</a:t>
+            </a:fld>
+            <a:endParaRPr lang="en-US"/>
+          </a:p>
+        </p:txBody>
+      </p:sp>
+    </p:spTree>
+    <p:extLst>
+      <p:ext uri="{BB962C8B-B14F-4D97-AF65-F5344CB8AC3E}">
+        <p14:creationId xmlns:p14="http://schemas.microsoft.com/office/powerpoint/2010/main" val="3533582199"/>
+      </p:ext>
+    </p:extLst>
+  </p:cSld>
+  <p:clrMapOvr>
+    <a:masterClrMapping/>
+  </p:clrMapOvr>
+</p:notes>
+</file>
+
+<file path=ppt/notesSlides/notesSlide5.xml><?xml version="1.0" encoding="utf-8"?>
+<p:notes xmlns:a="http://schemas.openxmlformats.org/drawingml/2006/main" xmlns:r="http://schemas.openxmlformats.org/officeDocument/2006/relationships" xmlns:p="http://schemas.openxmlformats.org/presentationml/2006/main">
+  <p:cSld>
+    <p:spTree>
+      <p:nvGrpSpPr>
+        <p:cNvPr id="1" name=""/>
+        <p:cNvGrpSpPr/>
+        <p:nvPr/>
+      </p:nvGrpSpPr>
+      <p:grpSpPr>
+        <a:xfrm>
+          <a:off x="0" y="0"/>
+          <a:ext cx="0" cy="0"/>
+          <a:chOff x="0" y="0"/>
+          <a:chExt cx="0" cy="0"/>
+        </a:xfrm>
+      </p:grpSpPr>
+      <p:sp>
+        <p:nvSpPr>
+          <p:cNvPr id="2" name="Slide Image Placeholder 1"/>
+          <p:cNvSpPr>
+            <a:spLocks noGrp="1" noRot="1" noChangeAspect="1"/>
+          </p:cNvSpPr>
+          <p:nvPr>
+            <p:ph type="sldImg"/>
+          </p:nvPr>
+        </p:nvSpPr>
+        <p:spPr/>
+      </p:sp>
+      <p:sp>
+        <p:nvSpPr>
+          <p:cNvPr id="3" name="Notes Placeholder 2"/>
+          <p:cNvSpPr>
+            <a:spLocks noGrp="1"/>
+          </p:cNvSpPr>
+          <p:nvPr>
+            <p:ph type="body" idx="1"/>
+          </p:nvPr>
+        </p:nvSpPr>
+        <p:spPr/>
+        <p:txBody>
+          <a:bodyPr/>
+          <a:lstStyle/>
+          <a:p>
+            <a:r>
+              <a:rPr lang="en-US" dirty="0"/>
+              <a:t>James</a:t>
+            </a:r>
+          </a:p>
+        </p:txBody>
+      </p:sp>
+      <p:sp>
+        <p:nvSpPr>
+          <p:cNvPr id="4" name="Slide Number Placeholder 3"/>
+          <p:cNvSpPr>
+            <a:spLocks noGrp="1"/>
+          </p:cNvSpPr>
+          <p:nvPr>
+            <p:ph type="sldNum" sz="quarter" idx="10"/>
+          </p:nvPr>
+        </p:nvSpPr>
+        <p:spPr/>
+        <p:txBody>
+          <a:bodyPr/>
+          <a:lstStyle/>
+          <a:p>
+            <a:fld id="{BF105DB2-FD3E-441D-8B7E-7AE83ECE27B3}" type="slidenum">
+              <a:rPr lang="en-US" smtClean="0"/>
+              <a:t>5</a:t>
+            </a:fld>
+            <a:endParaRPr lang="en-US"/>
+          </a:p>
+        </p:txBody>
+      </p:sp>
+    </p:spTree>
+    <p:extLst>
+      <p:ext uri="{BB962C8B-B14F-4D97-AF65-F5344CB8AC3E}">
+        <p14:creationId xmlns:p14="http://schemas.microsoft.com/office/powerpoint/2010/main" val="3519427517"/>
+      </p:ext>
+    </p:extLst>
+  </p:cSld>
+  <p:clrMapOvr>
+    <a:masterClrMapping/>
+  </p:clrMapOvr>
+</p:notes>
+</file>
+
+<file path=ppt/notesSlides/notesSlide6.xml><?xml version="1.0" encoding="utf-8"?>
+<p:notes xmlns:a="http://schemas.openxmlformats.org/drawingml/2006/main" xmlns:r="http://schemas.openxmlformats.org/officeDocument/2006/relationships" xmlns:p="http://schemas.openxmlformats.org/presentationml/2006/main">
+  <p:cSld>
+    <p:spTree>
+      <p:nvGrpSpPr>
+        <p:cNvPr id="1" name=""/>
+        <p:cNvGrpSpPr/>
+        <p:nvPr/>
+      </p:nvGrpSpPr>
+      <p:grpSpPr>
+        <a:xfrm>
+          <a:off x="0" y="0"/>
+          <a:ext cx="0" cy="0"/>
+          <a:chOff x="0" y="0"/>
+          <a:chExt cx="0" cy="0"/>
+        </a:xfrm>
+      </p:grpSpPr>
+      <p:sp>
+        <p:nvSpPr>
+          <p:cNvPr id="2" name="Slide Image Placeholder 1"/>
+          <p:cNvSpPr>
+            <a:spLocks noGrp="1" noRot="1" noChangeAspect="1"/>
+          </p:cNvSpPr>
+          <p:nvPr>
+            <p:ph type="sldImg"/>
+          </p:nvPr>
+        </p:nvSpPr>
+        <p:spPr/>
+      </p:sp>
+      <p:sp>
+        <p:nvSpPr>
+          <p:cNvPr id="3" name="Notes Placeholder 2"/>
+          <p:cNvSpPr>
+            <a:spLocks noGrp="1"/>
+          </p:cNvSpPr>
+          <p:nvPr>
+            <p:ph type="body" idx="1"/>
+          </p:nvPr>
+        </p:nvSpPr>
+        <p:spPr/>
+        <p:txBody>
+          <a:bodyPr/>
+          <a:lstStyle/>
+          <a:p>
+            <a:r>
+              <a:rPr lang="en-US" dirty="0" err="1"/>
+              <a:t>Bokeh</a:t>
+            </a:r>
+            <a:r>
+              <a:rPr lang="en-US" dirty="0"/>
+              <a:t> streaming dashboard – YYQ</a:t>
+            </a:r>
+          </a:p>
+          <a:p>
+            <a:r>
+              <a:rPr lang="en-US" dirty="0"/>
+              <a:t>Tableau – </a:t>
+            </a:r>
+            <a:r>
+              <a:rPr lang="en-US" dirty="0" err="1"/>
+              <a:t>Annalaissa</a:t>
+            </a:r>
+            <a:endParaRPr lang="en-US" dirty="0"/>
+          </a:p>
+        </p:txBody>
+      </p:sp>
+      <p:sp>
+        <p:nvSpPr>
+          <p:cNvPr id="4" name="Slide Number Placeholder 3"/>
+          <p:cNvSpPr>
+            <a:spLocks noGrp="1"/>
+          </p:cNvSpPr>
+          <p:nvPr>
+            <p:ph type="sldNum" sz="quarter" idx="10"/>
+          </p:nvPr>
+        </p:nvSpPr>
+        <p:spPr/>
+        <p:txBody>
+          <a:bodyPr/>
+          <a:lstStyle/>
+          <a:p>
+            <a:fld id="{BF105DB2-FD3E-441D-8B7E-7AE83ECE27B3}" type="slidenum">
+              <a:rPr lang="en-US" smtClean="0"/>
+              <a:t>6</a:t>
+            </a:fld>
+            <a:endParaRPr lang="en-US"/>
+          </a:p>
+        </p:txBody>
+      </p:sp>
+    </p:spTree>
+    <p:extLst>
+      <p:ext uri="{BB962C8B-B14F-4D97-AF65-F5344CB8AC3E}">
+        <p14:creationId xmlns:p14="http://schemas.microsoft.com/office/powerpoint/2010/main" val="2981153451"/>
+      </p:ext>
+    </p:extLst>
+  </p:cSld>
+  <p:clrMapOvr>
+    <a:masterClrMapping/>
+  </p:clrMapOvr>
+</p:notes>
+</file>
+
+<file path=ppt/notesSlides/notesSlide7.xml><?xml version="1.0" encoding="utf-8"?>
+<p:notes xmlns:a="http://schemas.openxmlformats.org/drawingml/2006/main" xmlns:r="http://schemas.openxmlformats.org/officeDocument/2006/relationships" xmlns:p="http://schemas.openxmlformats.org/presentationml/2006/main">
+  <p:cSld>
+    <p:spTree>
+      <p:nvGrpSpPr>
+        <p:cNvPr id="1" name=""/>
+        <p:cNvGrpSpPr/>
+        <p:nvPr/>
+      </p:nvGrpSpPr>
+      <p:grpSpPr>
+        <a:xfrm>
+          <a:off x="0" y="0"/>
+          <a:ext cx="0" cy="0"/>
+          <a:chOff x="0" y="0"/>
+          <a:chExt cx="0" cy="0"/>
+        </a:xfrm>
+      </p:grpSpPr>
+      <p:sp>
+        <p:nvSpPr>
+          <p:cNvPr id="2" name="Slide Image Placeholder 1"/>
+          <p:cNvSpPr>
+            <a:spLocks noGrp="1" noRot="1" noChangeAspect="1"/>
+          </p:cNvSpPr>
+          <p:nvPr>
+            <p:ph type="sldImg"/>
+          </p:nvPr>
+        </p:nvSpPr>
+        <p:spPr/>
+      </p:sp>
+      <p:sp>
+        <p:nvSpPr>
+          <p:cNvPr id="3" name="Notes Placeholder 2"/>
+          <p:cNvSpPr>
+            <a:spLocks noGrp="1"/>
+          </p:cNvSpPr>
+          <p:nvPr>
+            <p:ph type="body" idx="1"/>
+          </p:nvPr>
+        </p:nvSpPr>
+        <p:spPr/>
+        <p:txBody>
+          <a:bodyPr/>
+          <a:lstStyle/>
+          <a:p>
+            <a:r>
+              <a:rPr lang="en-US" dirty="0" err="1"/>
+              <a:t>Bokeh</a:t>
+            </a:r>
+            <a:r>
+              <a:rPr lang="en-US" dirty="0"/>
+              <a:t> static dashboard - </a:t>
+            </a:r>
+            <a:r>
+              <a:rPr lang="en-US" dirty="0" err="1"/>
+              <a:t>Weixing</a:t>
+            </a:r>
+            <a:endParaRPr lang="en-US" dirty="0"/>
+          </a:p>
+        </p:txBody>
+      </p:sp>
+      <p:sp>
+        <p:nvSpPr>
+          <p:cNvPr id="4" name="Slide Number Placeholder 3"/>
+          <p:cNvSpPr>
+            <a:spLocks noGrp="1"/>
+          </p:cNvSpPr>
+          <p:nvPr>
+            <p:ph type="sldNum" sz="quarter" idx="10"/>
+          </p:nvPr>
+        </p:nvSpPr>
+        <p:spPr/>
+        <p:txBody>
+          <a:bodyPr/>
+          <a:lstStyle/>
+          <a:p>
+            <a:fld id="{BF105DB2-FD3E-441D-8B7E-7AE83ECE27B3}" type="slidenum">
+              <a:rPr lang="en-US" smtClean="0"/>
+              <a:t>7</a:t>
+            </a:fld>
+            <a:endParaRPr lang="en-US"/>
+          </a:p>
+        </p:txBody>
+      </p:sp>
+    </p:spTree>
+    <p:extLst>
+      <p:ext uri="{BB962C8B-B14F-4D97-AF65-F5344CB8AC3E}">
+        <p14:creationId xmlns:p14="http://schemas.microsoft.com/office/powerpoint/2010/main" val="212910334"/>
+      </p:ext>
+    </p:extLst>
+  </p:cSld>
+  <p:clrMapOvr>
+    <a:masterClrMapping/>
+  </p:clrMapOvr>
+</p:notes>
+</file>
+
+<file path=ppt/notesSlides/notesSlide8.xml><?xml version="1.0" encoding="utf-8"?>
+<p:notes xmlns:a="http://schemas.openxmlformats.org/drawingml/2006/main" xmlns:r="http://schemas.openxmlformats.org/officeDocument/2006/relationships" xmlns:p="http://schemas.openxmlformats.org/presentationml/2006/main">
+  <p:cSld>
+    <p:spTree>
+      <p:nvGrpSpPr>
+        <p:cNvPr id="1" name=""/>
+        <p:cNvGrpSpPr/>
+        <p:nvPr/>
+      </p:nvGrpSpPr>
+      <p:grpSpPr>
+        <a:xfrm>
+          <a:off x="0" y="0"/>
+          <a:ext cx="0" cy="0"/>
+          <a:chOff x="0" y="0"/>
+          <a:chExt cx="0" cy="0"/>
+        </a:xfrm>
+      </p:grpSpPr>
+      <p:sp>
+        <p:nvSpPr>
+          <p:cNvPr id="2" name="Slide Image Placeholder 1"/>
+          <p:cNvSpPr>
+            <a:spLocks noGrp="1" noRot="1" noChangeAspect="1"/>
+          </p:cNvSpPr>
+          <p:nvPr>
+            <p:ph type="sldImg"/>
+          </p:nvPr>
+        </p:nvSpPr>
+        <p:spPr/>
+      </p:sp>
+      <p:sp>
+        <p:nvSpPr>
+          <p:cNvPr id="3" name="Notes Placeholder 2"/>
+          <p:cNvSpPr>
+            <a:spLocks noGrp="1"/>
+          </p:cNvSpPr>
+          <p:nvPr>
+            <p:ph type="body" idx="1"/>
+          </p:nvPr>
+        </p:nvSpPr>
+        <p:spPr/>
+        <p:txBody>
+          <a:bodyPr/>
+          <a:lstStyle/>
+          <a:p>
+            <a:r>
+              <a:rPr lang="en-US" dirty="0" err="1"/>
+              <a:t>Bokeh</a:t>
+            </a:r>
+            <a:r>
+              <a:rPr lang="en-US" dirty="0"/>
+              <a:t> static dashboard - </a:t>
+            </a:r>
+            <a:r>
+              <a:rPr lang="en-US" dirty="0" err="1"/>
+              <a:t>Weixing</a:t>
+            </a:r>
+            <a:endParaRPr lang="en-US" dirty="0"/>
+          </a:p>
+        </p:txBody>
+      </p:sp>
+      <p:sp>
+        <p:nvSpPr>
+          <p:cNvPr id="4" name="Slide Number Placeholder 3"/>
+          <p:cNvSpPr>
+            <a:spLocks noGrp="1"/>
+          </p:cNvSpPr>
+          <p:nvPr>
+            <p:ph type="sldNum" sz="quarter" idx="10"/>
+          </p:nvPr>
+        </p:nvSpPr>
+        <p:spPr/>
+        <p:txBody>
+          <a:bodyPr/>
+          <a:lstStyle/>
+          <a:p>
+            <a:fld id="{BF105DB2-FD3E-441D-8B7E-7AE83ECE27B3}" type="slidenum">
+              <a:rPr lang="en-US" smtClean="0"/>
+              <a:t>8</a:t>
+            </a:fld>
+            <a:endParaRPr lang="en-US"/>
+          </a:p>
+        </p:txBody>
+      </p:sp>
+    </p:spTree>
+    <p:extLst>
+      <p:ext uri="{BB962C8B-B14F-4D97-AF65-F5344CB8AC3E}">
+        <p14:creationId xmlns:p14="http://schemas.microsoft.com/office/powerpoint/2010/main" val="2299238784"/>
+      </p:ext>
+    </p:extLst>
+  </p:cSld>
+  <p:clrMapOvr>
+    <a:masterClrMapping/>
+  </p:clrMapOvr>
+</p:notes>
+</file>
+
+<file path=ppt/notesSlides/notesSlide9.xml><?xml version="1.0" encoding="utf-8"?>
+<p:notes xmlns:a="http://schemas.openxmlformats.org/drawingml/2006/main" xmlns:r="http://schemas.openxmlformats.org/officeDocument/2006/relationships" xmlns:p="http://schemas.openxmlformats.org/presentationml/2006/main">
+  <p:cSld>
+    <p:spTree>
+      <p:nvGrpSpPr>
+        <p:cNvPr id="1" name=""/>
+        <p:cNvGrpSpPr/>
+        <p:nvPr/>
+      </p:nvGrpSpPr>
+      <p:grpSpPr>
+        <a:xfrm>
+          <a:off x="0" y="0"/>
+          <a:ext cx="0" cy="0"/>
+          <a:chOff x="0" y="0"/>
+          <a:chExt cx="0" cy="0"/>
+        </a:xfrm>
+      </p:grpSpPr>
+      <p:sp>
+        <p:nvSpPr>
+          <p:cNvPr id="2" name="Slide Image Placeholder 1"/>
+          <p:cNvSpPr>
+            <a:spLocks noGrp="1" noRot="1" noChangeAspect="1"/>
+          </p:cNvSpPr>
+          <p:nvPr>
+            <p:ph type="sldImg"/>
+          </p:nvPr>
+        </p:nvSpPr>
+        <p:spPr/>
+      </p:sp>
+      <p:sp>
+        <p:nvSpPr>
+          <p:cNvPr id="3" name="Notes Placeholder 2"/>
+          <p:cNvSpPr>
+            <a:spLocks noGrp="1"/>
+          </p:cNvSpPr>
+          <p:nvPr>
+            <p:ph type="body" idx="1"/>
+          </p:nvPr>
+        </p:nvSpPr>
+        <p:spPr/>
+        <p:txBody>
+          <a:bodyPr/>
+          <a:lstStyle/>
+          <a:p>
+            <a:r>
+              <a:rPr lang="en-US" dirty="0" err="1"/>
+              <a:t>Annalaissa</a:t>
+            </a:r>
+            <a:endParaRPr lang="en-US" dirty="0"/>
+          </a:p>
+        </p:txBody>
+      </p:sp>
+      <p:sp>
+        <p:nvSpPr>
+          <p:cNvPr id="4" name="Slide Number Placeholder 3"/>
+          <p:cNvSpPr>
+            <a:spLocks noGrp="1"/>
+          </p:cNvSpPr>
+          <p:nvPr>
+            <p:ph type="sldNum" sz="quarter" idx="10"/>
+          </p:nvPr>
+        </p:nvSpPr>
+        <p:spPr/>
+        <p:txBody>
+          <a:bodyPr/>
+          <a:lstStyle/>
+          <a:p>
+            <a:fld id="{BF105DB2-FD3E-441D-8B7E-7AE83ECE27B3}" type="slidenum">
+              <a:rPr lang="en-US" smtClean="0"/>
+              <a:t>9</a:t>
+            </a:fld>
+            <a:endParaRPr lang="en-US"/>
+          </a:p>
+        </p:txBody>
+      </p:sp>
+    </p:spTree>
+    <p:extLst>
+      <p:ext uri="{BB962C8B-B14F-4D97-AF65-F5344CB8AC3E}">
+        <p14:creationId xmlns:p14="http://schemas.microsoft.com/office/powerpoint/2010/main" val="331738230"/>
+      </p:ext>
+    </p:extLst>
+  </p:cSld>
+  <p:clrMapOvr>
+    <a:masterClrMapping/>
+  </p:clrMapOvr>
+</p:notes>
+</file>
+
 <file path=ppt/slideLayouts/slideLayout1.xml><?xml version="1.0" encoding="utf-8"?>
 <p:sldLayout xmlns:a="http://schemas.openxmlformats.org/drawingml/2006/main" xmlns:r="http://schemas.openxmlformats.org/officeDocument/2006/relationships" xmlns:p="http://schemas.openxmlformats.org/presentationml/2006/main" showMasterSp="0" type="title" preserve="1">
   <p:cSld name="Title Slide">
@@ -8215,6 +9034,133 @@
 </p:sld>
 </file>
 
+<file path=ppt/slides/slide10.xml><?xml version="1.0" encoding="utf-8"?>
+<p:sld xmlns:a="http://schemas.openxmlformats.org/drawingml/2006/main" xmlns:r="http://schemas.openxmlformats.org/officeDocument/2006/relationships" xmlns:p="http://schemas.openxmlformats.org/presentationml/2006/main">
+  <p:cSld>
+    <p:spTree>
+      <p:nvGrpSpPr>
+        <p:cNvPr id="1" name=""/>
+        <p:cNvGrpSpPr/>
+        <p:nvPr/>
+      </p:nvGrpSpPr>
+      <p:grpSpPr>
+        <a:xfrm>
+          <a:off x="0" y="0"/>
+          <a:ext cx="0" cy="0"/>
+          <a:chOff x="0" y="0"/>
+          <a:chExt cx="0" cy="0"/>
+        </a:xfrm>
+      </p:grpSpPr>
+      <p:sp>
+        <p:nvSpPr>
+          <p:cNvPr id="2" name="Title 1"/>
+          <p:cNvSpPr>
+            <a:spLocks noGrp="1"/>
+          </p:cNvSpPr>
+          <p:nvPr>
+            <p:ph type="title"/>
+          </p:nvPr>
+        </p:nvSpPr>
+        <p:spPr/>
+        <p:txBody>
+          <a:bodyPr/>
+          <a:lstStyle/>
+          <a:p>
+            <a:r>
+              <a:rPr lang="en-US" dirty="0"/>
+              <a:t>Appendix: Dataflow Detailed</a:t>
+            </a:r>
+          </a:p>
+        </p:txBody>
+      </p:sp>
+      <p:graphicFrame>
+        <p:nvGraphicFramePr>
+          <p:cNvPr id="3" name="Object 2">
+            <a:extLst>
+              <a:ext uri="{FF2B5EF4-FFF2-40B4-BE49-F238E27FC236}">
+                <a16:creationId xmlns:a16="http://schemas.microsoft.com/office/drawing/2014/main" id="{1ECAC440-933B-4372-8A66-AFCD2805CC30}"/>
+              </a:ext>
+            </a:extLst>
+          </p:cNvPr>
+          <p:cNvGraphicFramePr>
+            <a:graphicFrameLocks noChangeAspect="1"/>
+          </p:cNvGraphicFramePr>
+          <p:nvPr>
+            <p:extLst>
+              <p:ext uri="{D42A27DB-BD31-4B8C-83A1-F6EECF244321}">
+                <p14:modId xmlns:p14="http://schemas.microsoft.com/office/powerpoint/2010/main" val="974402487"/>
+              </p:ext>
+            </p:extLst>
+          </p:nvPr>
+        </p:nvGraphicFramePr>
+        <p:xfrm>
+          <a:off x="1638300" y="1474788"/>
+          <a:ext cx="8912225" cy="4927600"/>
+        </p:xfrm>
+        <a:graphic>
+          <a:graphicData uri="http://schemas.openxmlformats.org/presentationml/2006/ole">
+            <mc:AlternateContent xmlns:mc="http://schemas.openxmlformats.org/markup-compatibility/2006">
+              <mc:Choice xmlns:v="urn:schemas-microsoft-com:vml" Requires="v">
+                <p:oleObj spid="_x0000_s1042" name="Visio" r:id="rId3" imgW="11308655" imgH="6252807" progId="Visio.Drawing.11">
+                  <p:embed/>
+                </p:oleObj>
+              </mc:Choice>
+              <mc:Fallback>
+                <p:oleObj name="Visio" r:id="rId3" imgW="11308655" imgH="6252807" progId="Visio.Drawing.11">
+                  <p:embed/>
+                  <p:pic>
+                    <p:nvPicPr>
+                      <p:cNvPr id="0" name=""/>
+                      <p:cNvPicPr/>
+                      <p:nvPr/>
+                    </p:nvPicPr>
+                    <p:blipFill>
+                      <a:blip r:embed="rId4"/>
+                      <a:stretch>
+                        <a:fillRect/>
+                      </a:stretch>
+                    </p:blipFill>
+                    <p:spPr>
+                      <a:xfrm>
+                        <a:off x="1638300" y="1474788"/>
+                        <a:ext cx="8912225" cy="4927600"/>
+                      </a:xfrm>
+                      <a:prstGeom prst="rect">
+                        <a:avLst/>
+                      </a:prstGeom>
+                    </p:spPr>
+                  </p:pic>
+                </p:oleObj>
+              </mc:Fallback>
+            </mc:AlternateContent>
+          </a:graphicData>
+        </a:graphic>
+      </p:graphicFrame>
+    </p:spTree>
+    <p:extLst>
+      <p:ext uri="{BB962C8B-B14F-4D97-AF65-F5344CB8AC3E}">
+        <p14:creationId xmlns:p14="http://schemas.microsoft.com/office/powerpoint/2010/main" val="427281834"/>
+      </p:ext>
+    </p:extLst>
+  </p:cSld>
+  <p:clrMapOvr>
+    <a:masterClrMapping/>
+  </p:clrMapOvr>
+  <mc:AlternateContent xmlns:mc="http://schemas.openxmlformats.org/markup-compatibility/2006" xmlns:p14="http://schemas.microsoft.com/office/powerpoint/2010/main">
+    <mc:Choice Requires="p14">
+      <p:transition spd="med" p14:dur="700">
+        <p:fade/>
+      </p:transition>
+    </mc:Choice>
+    <mc:Fallback xmlns="">
+      <p:transition spd="med">
+        <p:fade/>
+      </p:transition>
+    </mc:Fallback>
+  </mc:AlternateContent>
+</p:sld>
+</file>
+
 <file path=ppt/slides/slide2.xml><?xml version="1.0" encoding="utf-8"?>
 <p:sld xmlns:a="http://schemas.openxmlformats.org/drawingml/2006/main" xmlns:r="http://schemas.openxmlformats.org/officeDocument/2006/relationships" xmlns:p="http://schemas.openxmlformats.org/presentationml/2006/main">
   <p:cSld>
@@ -8383,7 +9329,7 @@
           <a:p>
             <a:r>
               <a:rPr lang="en-US" dirty="0"/>
-              <a:t>We built a scalable data transformed pipeline using three aggregated client data sources:</a:t>
+              <a:t>We built a scalable data transformation pipeline using three aggregated client data sources:</a:t>
             </a:r>
           </a:p>
           <a:p>
@@ -8531,7 +9477,7 @@
         </p:xfrm>
         <a:graphic>
           <a:graphicData uri="http://schemas.openxmlformats.org/drawingml/2006/diagram">
-            <dgm:relIds xmlns:dgm="http://schemas.openxmlformats.org/drawingml/2006/diagram" xmlns:r="http://schemas.openxmlformats.org/officeDocument/2006/relationships" r:dm="rId2" r:lo="rId3" r:qs="rId4" r:cs="rId5"/>
+            <dgm:relIds xmlns:dgm="http://schemas.openxmlformats.org/drawingml/2006/diagram" xmlns:r="http://schemas.openxmlformats.org/officeDocument/2006/relationships" r:dm="rId3" r:lo="rId4" r:qs="rId5" r:cs="rId6"/>
           </a:graphicData>
         </a:graphic>
       </p:graphicFrame>
@@ -8614,25 +9560,25 @@
           <p:nvPr>
             <p:extLst>
               <p:ext uri="{D42A27DB-BD31-4B8C-83A1-F6EECF244321}">
-                <p14:modId xmlns:p14="http://schemas.microsoft.com/office/powerpoint/2010/main" val="3930043235"/>
+                <p14:modId xmlns:p14="http://schemas.microsoft.com/office/powerpoint/2010/main" val="2651192925"/>
               </p:ext>
             </p:extLst>
           </p:nvPr>
         </p:nvGraphicFramePr>
         <p:xfrm>
-          <a:off x="3373438" y="1738313"/>
-          <a:ext cx="5443537" cy="4400550"/>
+          <a:off x="3170238" y="1738313"/>
+          <a:ext cx="5848350" cy="4400550"/>
         </p:xfrm>
         <a:graphic>
           <a:graphicData uri="http://schemas.openxmlformats.org/presentationml/2006/ole">
             <mc:AlternateContent xmlns:mc="http://schemas.openxmlformats.org/markup-compatibility/2006">
               <mc:Choice xmlns:v="urn:schemas-microsoft-com:vml" Requires="v">
-                <p:oleObj spid="_x0000_s2052" name="Visio" r:id="rId3" imgW="6908033" imgH="5583384" progId="Visio.Drawing.11">
+                <p:oleObj spid="_x0000_s2057" name="Visio" r:id="rId4" imgW="7422551" imgH="5583384" progId="Visio.Drawing.11">
                   <p:embed/>
                 </p:oleObj>
               </mc:Choice>
               <mc:Fallback>
-                <p:oleObj name="Visio" r:id="rId3" imgW="6908033" imgH="5583384" progId="Visio.Drawing.11">
+                <p:oleObj name="Visio" r:id="rId4" imgW="7422551" imgH="5583384" progId="Visio.Drawing.11">
                   <p:embed/>
                   <p:pic>
                     <p:nvPicPr>
@@ -8647,15 +9593,15 @@
                       <p:nvPr/>
                     </p:nvPicPr>
                     <p:blipFill>
-                      <a:blip r:embed="rId4"/>
+                      <a:blip r:embed="rId5"/>
                       <a:stretch>
                         <a:fillRect/>
                       </a:stretch>
                     </p:blipFill>
                     <p:spPr>
                       <a:xfrm>
-                        <a:off x="3373438" y="1738313"/>
-                        <a:ext cx="5443537" cy="4400550"/>
+                        <a:off x="3170238" y="1738313"/>
+                        <a:ext cx="5848350" cy="4400550"/>
                       </a:xfrm>
                       <a:prstGeom prst="rect">
                         <a:avLst/>
@@ -8747,14 +9693,14 @@
           <p:nvPr>
             <p:extLst>
               <p:ext uri="{D42A27DB-BD31-4B8C-83A1-F6EECF244321}">
-                <p14:modId xmlns:p14="http://schemas.microsoft.com/office/powerpoint/2010/main" val="4156151266"/>
+                <p14:modId xmlns:p14="http://schemas.microsoft.com/office/powerpoint/2010/main" val="2503710021"/>
               </p:ext>
             </p:extLst>
           </p:nvPr>
         </p:nvGraphicFramePr>
         <p:xfrm>
           <a:off x="1522412" y="1752600"/>
-          <a:ext cx="9144000" cy="4023360"/>
+          <a:ext cx="9144000" cy="4297680"/>
         </p:xfrm>
         <a:graphic>
           <a:graphicData uri="http://schemas.openxmlformats.org/drawingml/2006/table">
@@ -8791,7 +9737,14 @@
                       </a:r>
                       <a:r>
                         <a:rPr lang="en-US" dirty="0"/>
-                        <a:t> Dashboard</a:t>
+                        <a:t> dashboard 1</a:t>
+                      </a:r>
+                    </a:p>
+                    <a:p>
+                      <a:pPr algn="ctr"/>
+                      <a:r>
+                        <a:rPr lang="en-US" dirty="0"/>
+                        <a:t>“main.py”</a:t>
                       </a:r>
                     </a:p>
                   </a:txBody>
@@ -8805,7 +9758,15 @@
                       <a:pPr algn="ctr"/>
                       <a:r>
                         <a:rPr lang="en-US" dirty="0"/>
-                        <a:t>Tableau workbook</a:t>
+                        <a:t>Tableau workbook “</a:t>
+                      </a:r>
+                      <a:r>
+                        <a:rPr lang="en-US" dirty="0" err="1"/>
+                        <a:t>qc_data_dashboard.twb</a:t>
+                      </a:r>
+                      <a:r>
+                        <a:rPr lang="en-US" dirty="0"/>
+                        <a:t>”</a:t>
                       </a:r>
                     </a:p>
                   </a:txBody>
@@ -8863,7 +9824,7 @@
           <p:nvPr/>
         </p:nvPicPr>
         <p:blipFill>
-          <a:blip r:embed="rId2" cstate="print">
+          <a:blip r:embed="rId3" cstate="print">
             <a:extLst>
               <a:ext uri="{28A0092B-C50C-407E-A947-70E740481C1C}">
                 <a14:useLocalDpi xmlns:a14="http://schemas.microsoft.com/office/drawing/2010/main" val="0"/>
@@ -8876,7 +9837,7 @@
         </p:blipFill>
         <p:spPr>
           <a:xfrm>
-            <a:off x="6627812" y="2500996"/>
+            <a:off x="6627812" y="2653396"/>
             <a:ext cx="3657600" cy="2909204"/>
           </a:xfrm>
           <a:prstGeom prst="rect">
@@ -8899,14 +9860,14 @@
           <p:nvPr/>
         </p:nvPicPr>
         <p:blipFill>
-          <a:blip r:embed="rId3"/>
+          <a:blip r:embed="rId4"/>
           <a:stretch>
             <a:fillRect/>
           </a:stretch>
         </p:blipFill>
         <p:spPr>
           <a:xfrm>
-            <a:off x="2513012" y="2355398"/>
+            <a:off x="2513012" y="2514600"/>
             <a:ext cx="2871899" cy="3200400"/>
           </a:xfrm>
           <a:prstGeom prst="rect">
@@ -8940,6 +9901,482 @@
 </file>
 
 <file path=ppt/slides/slide7.xml><?xml version="1.0" encoding="utf-8"?>
+<p:sld xmlns:a="http://schemas.openxmlformats.org/drawingml/2006/main" xmlns:r="http://schemas.openxmlformats.org/officeDocument/2006/relationships" xmlns:p="http://schemas.openxmlformats.org/presentationml/2006/main">
+  <p:cSld>
+    <p:spTree>
+      <p:nvGrpSpPr>
+        <p:cNvPr id="1" name=""/>
+        <p:cNvGrpSpPr/>
+        <p:nvPr/>
+      </p:nvGrpSpPr>
+      <p:grpSpPr>
+        <a:xfrm>
+          <a:off x="0" y="0"/>
+          <a:ext cx="0" cy="0"/>
+          <a:chOff x="0" y="0"/>
+          <a:chExt cx="0" cy="0"/>
+        </a:xfrm>
+      </p:grpSpPr>
+      <p:sp>
+        <p:nvSpPr>
+          <p:cNvPr id="2" name="Title 1"/>
+          <p:cNvSpPr>
+            <a:spLocks noGrp="1"/>
+          </p:cNvSpPr>
+          <p:nvPr>
+            <p:ph type="title"/>
+          </p:nvPr>
+        </p:nvSpPr>
+        <p:spPr/>
+        <p:txBody>
+          <a:bodyPr/>
+          <a:lstStyle/>
+          <a:p>
+            <a:r>
+              <a:rPr lang="en-US" dirty="0"/>
+              <a:t>Results Continued</a:t>
+            </a:r>
+          </a:p>
+        </p:txBody>
+      </p:sp>
+      <p:graphicFrame>
+        <p:nvGraphicFramePr>
+          <p:cNvPr id="7" name="Table 6">
+            <a:extLst>
+              <a:ext uri="{FF2B5EF4-FFF2-40B4-BE49-F238E27FC236}">
+                <a16:creationId xmlns:a16="http://schemas.microsoft.com/office/drawing/2014/main" id="{8D949C5B-9548-4288-BB5D-A59BB74AFA77}"/>
+              </a:ext>
+            </a:extLst>
+          </p:cNvPr>
+          <p:cNvGraphicFramePr>
+            <a:graphicFrameLocks noGrp="1"/>
+          </p:cNvGraphicFramePr>
+          <p:nvPr>
+            <p:extLst>
+              <p:ext uri="{D42A27DB-BD31-4B8C-83A1-F6EECF244321}">
+                <p14:modId xmlns:p14="http://schemas.microsoft.com/office/powerpoint/2010/main" val="3855604894"/>
+              </p:ext>
+            </p:extLst>
+          </p:nvPr>
+        </p:nvGraphicFramePr>
+        <p:xfrm>
+          <a:off x="1522412" y="1752600"/>
+          <a:ext cx="9144000" cy="4297680"/>
+        </p:xfrm>
+        <a:graphic>
+          <a:graphicData uri="http://schemas.openxmlformats.org/drawingml/2006/table">
+            <a:tbl>
+              <a:tblPr firstRow="1" bandRow="1">
+                <a:tableStyleId>{6E25E649-3F16-4E02-A733-19D2CDBF48F0}</a:tableStyleId>
+              </a:tblPr>
+              <a:tblGrid>
+                <a:gridCol w="4572000">
+                  <a:extLst>
+                    <a:ext uri="{9D8B030D-6E8A-4147-A177-3AD203B41FA5}">
+                      <a16:colId xmlns:a16="http://schemas.microsoft.com/office/drawing/2014/main" val="1381258496"/>
+                    </a:ext>
+                  </a:extLst>
+                </a:gridCol>
+                <a:gridCol w="4572000">
+                  <a:extLst>
+                    <a:ext uri="{9D8B030D-6E8A-4147-A177-3AD203B41FA5}">
+                      <a16:colId xmlns:a16="http://schemas.microsoft.com/office/drawing/2014/main" val="1361091184"/>
+                    </a:ext>
+                  </a:extLst>
+                </a:gridCol>
+              </a:tblGrid>
+              <a:tr h="152400">
+                <a:tc>
+                  <a:txBody>
+                    <a:bodyPr/>
+                    <a:lstStyle/>
+                    <a:p>
+                      <a:pPr algn="ctr"/>
+                      <a:r>
+                        <a:rPr lang="en-US" dirty="0" err="1"/>
+                        <a:t>Bokeh</a:t>
+                      </a:r>
+                      <a:r>
+                        <a:rPr lang="en-US" dirty="0"/>
+                        <a:t> dashboard 2</a:t>
+                      </a:r>
+                    </a:p>
+                    <a:p>
+                      <a:pPr algn="ctr"/>
+                      <a:r>
+                        <a:rPr lang="en-US" dirty="0"/>
+                        <a:t>“qc_over_time.html”</a:t>
+                      </a:r>
+                    </a:p>
+                  </a:txBody>
+                  <a:tcPr/>
+                </a:tc>
+                <a:tc>
+                  <a:txBody>
+                    <a:bodyPr/>
+                    <a:lstStyle/>
+                    <a:p>
+                      <a:pPr marL="0" marR="0" lvl="0" indent="0" algn="ctr" defTabSz="914400" rtl="0" eaLnBrk="1" fontAlgn="auto" latinLnBrk="0" hangingPunct="1">
+                        <a:lnSpc>
+                          <a:spcPct val="100000"/>
+                        </a:lnSpc>
+                        <a:spcBef>
+                          <a:spcPts val="0"/>
+                        </a:spcBef>
+                        <a:spcAft>
+                          <a:spcPts val="0"/>
+                        </a:spcAft>
+                        <a:buClrTx/>
+                        <a:buSzTx/>
+                        <a:buFontTx/>
+                        <a:buNone/>
+                        <a:tabLst/>
+                        <a:defRPr/>
+                      </a:pPr>
+                      <a:r>
+                        <a:rPr lang="en-US" dirty="0" err="1"/>
+                        <a:t>Bokeh</a:t>
+                      </a:r>
+                      <a:r>
+                        <a:rPr lang="en-US" dirty="0"/>
+                        <a:t> dashboard 3</a:t>
+                      </a:r>
+                    </a:p>
+                    <a:p>
+                      <a:pPr marL="0" marR="0" lvl="0" indent="0" algn="ctr" defTabSz="914400" rtl="0" eaLnBrk="1" fontAlgn="auto" latinLnBrk="0" hangingPunct="1">
+                        <a:lnSpc>
+                          <a:spcPct val="100000"/>
+                        </a:lnSpc>
+                        <a:spcBef>
+                          <a:spcPts val="0"/>
+                        </a:spcBef>
+                        <a:spcAft>
+                          <a:spcPts val="0"/>
+                        </a:spcAft>
+                        <a:buClrTx/>
+                        <a:buSzTx/>
+                        <a:buFontTx/>
+                        <a:buNone/>
+                        <a:tabLst/>
+                        <a:defRPr/>
+                      </a:pPr>
+                      <a:r>
+                        <a:rPr lang="en-US" dirty="0"/>
+                        <a:t>“wx_select.html”</a:t>
+                      </a:r>
+                    </a:p>
+                  </a:txBody>
+                  <a:tcPr/>
+                </a:tc>
+                <a:extLst>
+                  <a:ext uri="{0D108BD9-81ED-4DB2-BD59-A6C34878D82A}">
+                    <a16:rowId xmlns:a16="http://schemas.microsoft.com/office/drawing/2014/main" val="1520145355"/>
+                  </a:ext>
+                </a:extLst>
+              </a:tr>
+              <a:tr h="3657600">
+                <a:tc>
+                  <a:txBody>
+                    <a:bodyPr/>
+                    <a:lstStyle/>
+                    <a:p>
+                      <a:endParaRPr lang="en-US" dirty="0"/>
+                    </a:p>
+                  </a:txBody>
+                  <a:tcPr/>
+                </a:tc>
+                <a:tc>
+                  <a:txBody>
+                    <a:bodyPr/>
+                    <a:lstStyle/>
+                    <a:p>
+                      <a:endParaRPr lang="en-US" dirty="0"/>
+                    </a:p>
+                  </a:txBody>
+                  <a:tcPr/>
+                </a:tc>
+                <a:extLst>
+                  <a:ext uri="{0D108BD9-81ED-4DB2-BD59-A6C34878D82A}">
+                    <a16:rowId xmlns:a16="http://schemas.microsoft.com/office/drawing/2014/main" val="4002927652"/>
+                  </a:ext>
+                </a:extLst>
+              </a:tr>
+            </a:tbl>
+          </a:graphicData>
+        </a:graphic>
+      </p:graphicFrame>
+      <p:pic>
+        <p:nvPicPr>
+          <p:cNvPr id="3" name="Picture 2">
+            <a:extLst>
+              <a:ext uri="{FF2B5EF4-FFF2-40B4-BE49-F238E27FC236}">
+                <a16:creationId xmlns:a16="http://schemas.microsoft.com/office/drawing/2014/main" id="{435EBAD6-D75E-4847-BBE6-062B3747965A}"/>
+              </a:ext>
+            </a:extLst>
+          </p:cNvPr>
+          <p:cNvPicPr>
+            <a:picLocks noChangeAspect="1"/>
+          </p:cNvPicPr>
+          <p:nvPr/>
+        </p:nvPicPr>
+        <p:blipFill>
+          <a:blip r:embed="rId3"/>
+          <a:stretch>
+            <a:fillRect/>
+          </a:stretch>
+        </p:blipFill>
+        <p:spPr>
+          <a:xfrm>
+            <a:off x="1674812" y="2924382"/>
+            <a:ext cx="4114800" cy="2107921"/>
+          </a:xfrm>
+          <a:prstGeom prst="rect">
+            <a:avLst/>
+          </a:prstGeom>
+        </p:spPr>
+      </p:pic>
+      <p:pic>
+        <p:nvPicPr>
+          <p:cNvPr id="4" name="Picture 3">
+            <a:extLst>
+              <a:ext uri="{FF2B5EF4-FFF2-40B4-BE49-F238E27FC236}">
+                <a16:creationId xmlns:a16="http://schemas.microsoft.com/office/drawing/2014/main" id="{3ADDF6BF-781E-4E28-AAD5-DB31485392A9}"/>
+              </a:ext>
+            </a:extLst>
+          </p:cNvPr>
+          <p:cNvPicPr>
+            <a:picLocks noChangeAspect="1"/>
+          </p:cNvPicPr>
+          <p:nvPr/>
+        </p:nvPicPr>
+        <p:blipFill>
+          <a:blip r:embed="rId4"/>
+          <a:stretch>
+            <a:fillRect/>
+          </a:stretch>
+        </p:blipFill>
+        <p:spPr>
+          <a:xfrm>
+            <a:off x="6399212" y="2946208"/>
+            <a:ext cx="4114800" cy="2064269"/>
+          </a:xfrm>
+          <a:prstGeom prst="rect">
+            <a:avLst/>
+          </a:prstGeom>
+        </p:spPr>
+      </p:pic>
+    </p:spTree>
+    <p:extLst>
+      <p:ext uri="{BB962C8B-B14F-4D97-AF65-F5344CB8AC3E}">
+        <p14:creationId xmlns:p14="http://schemas.microsoft.com/office/powerpoint/2010/main" val="712289283"/>
+      </p:ext>
+    </p:extLst>
+  </p:cSld>
+  <p:clrMapOvr>
+    <a:masterClrMapping/>
+  </p:clrMapOvr>
+  <mc:AlternateContent xmlns:mc="http://schemas.openxmlformats.org/markup-compatibility/2006" xmlns:p14="http://schemas.microsoft.com/office/powerpoint/2010/main">
+    <mc:Choice Requires="p14">
+      <p:transition spd="med" p14:dur="700">
+        <p:fade/>
+      </p:transition>
+    </mc:Choice>
+    <mc:Fallback xmlns="">
+      <p:transition spd="med">
+        <p:fade/>
+      </p:transition>
+    </mc:Fallback>
+  </mc:AlternateContent>
+</p:sld>
+</file>
+
+<file path=ppt/slides/slide8.xml><?xml version="1.0" encoding="utf-8"?>
+<p:sld xmlns:a="http://schemas.openxmlformats.org/drawingml/2006/main" xmlns:r="http://schemas.openxmlformats.org/officeDocument/2006/relationships" xmlns:p="http://schemas.openxmlformats.org/presentationml/2006/main">
+  <p:cSld>
+    <p:spTree>
+      <p:nvGrpSpPr>
+        <p:cNvPr id="1" name=""/>
+        <p:cNvGrpSpPr/>
+        <p:nvPr/>
+      </p:nvGrpSpPr>
+      <p:grpSpPr>
+        <a:xfrm>
+          <a:off x="0" y="0"/>
+          <a:ext cx="0" cy="0"/>
+          <a:chOff x="0" y="0"/>
+          <a:chExt cx="0" cy="0"/>
+        </a:xfrm>
+      </p:grpSpPr>
+      <p:sp>
+        <p:nvSpPr>
+          <p:cNvPr id="2" name="Title 1"/>
+          <p:cNvSpPr>
+            <a:spLocks noGrp="1"/>
+          </p:cNvSpPr>
+          <p:nvPr>
+            <p:ph type="title"/>
+          </p:nvPr>
+        </p:nvSpPr>
+        <p:spPr/>
+        <p:txBody>
+          <a:bodyPr/>
+          <a:lstStyle/>
+          <a:p>
+            <a:r>
+              <a:rPr lang="en-US" dirty="0"/>
+              <a:t>Results Continued</a:t>
+            </a:r>
+          </a:p>
+        </p:txBody>
+      </p:sp>
+      <p:graphicFrame>
+        <p:nvGraphicFramePr>
+          <p:cNvPr id="7" name="Table 6">
+            <a:extLst>
+              <a:ext uri="{FF2B5EF4-FFF2-40B4-BE49-F238E27FC236}">
+                <a16:creationId xmlns:a16="http://schemas.microsoft.com/office/drawing/2014/main" id="{8D949C5B-9548-4288-BB5D-A59BB74AFA77}"/>
+              </a:ext>
+            </a:extLst>
+          </p:cNvPr>
+          <p:cNvGraphicFramePr>
+            <a:graphicFrameLocks noGrp="1"/>
+          </p:cNvGraphicFramePr>
+          <p:nvPr>
+            <p:extLst>
+              <p:ext uri="{D42A27DB-BD31-4B8C-83A1-F6EECF244321}">
+                <p14:modId xmlns:p14="http://schemas.microsoft.com/office/powerpoint/2010/main" val="4088994077"/>
+              </p:ext>
+            </p:extLst>
+          </p:nvPr>
+        </p:nvGraphicFramePr>
+        <p:xfrm>
+          <a:off x="3808412" y="1752600"/>
+          <a:ext cx="4572000" cy="4297680"/>
+        </p:xfrm>
+        <a:graphic>
+          <a:graphicData uri="http://schemas.openxmlformats.org/drawingml/2006/table">
+            <a:tbl>
+              <a:tblPr firstRow="1" bandRow="1">
+                <a:tableStyleId>{6E25E649-3F16-4E02-A733-19D2CDBF48F0}</a:tableStyleId>
+              </a:tblPr>
+              <a:tblGrid>
+                <a:gridCol w="4572000">
+                  <a:extLst>
+                    <a:ext uri="{9D8B030D-6E8A-4147-A177-3AD203B41FA5}">
+                      <a16:colId xmlns:a16="http://schemas.microsoft.com/office/drawing/2014/main" val="1381258496"/>
+                    </a:ext>
+                  </a:extLst>
+                </a:gridCol>
+              </a:tblGrid>
+              <a:tr h="152400">
+                <a:tc>
+                  <a:txBody>
+                    <a:bodyPr/>
+                    <a:lstStyle/>
+                    <a:p>
+                      <a:pPr algn="ctr"/>
+                      <a:r>
+                        <a:rPr lang="en-US" dirty="0" err="1"/>
+                        <a:t>Bokeh</a:t>
+                      </a:r>
+                      <a:r>
+                        <a:rPr lang="en-US" dirty="0"/>
+                        <a:t> dashboard 4</a:t>
+                      </a:r>
+                    </a:p>
+                    <a:p>
+                      <a:pPr algn="ctr"/>
+                      <a:r>
+                        <a:rPr lang="en-US" dirty="0"/>
+                        <a:t>“wx_wy.html”</a:t>
+                      </a:r>
+                    </a:p>
+                  </a:txBody>
+                  <a:tcPr/>
+                </a:tc>
+                <a:extLst>
+                  <a:ext uri="{0D108BD9-81ED-4DB2-BD59-A6C34878D82A}">
+                    <a16:rowId xmlns:a16="http://schemas.microsoft.com/office/drawing/2014/main" val="1520145355"/>
+                  </a:ext>
+                </a:extLst>
+              </a:tr>
+              <a:tr h="3657600">
+                <a:tc>
+                  <a:txBody>
+                    <a:bodyPr/>
+                    <a:lstStyle/>
+                    <a:p>
+                      <a:endParaRPr lang="en-US" dirty="0"/>
+                    </a:p>
+                  </a:txBody>
+                  <a:tcPr/>
+                </a:tc>
+                <a:extLst>
+                  <a:ext uri="{0D108BD9-81ED-4DB2-BD59-A6C34878D82A}">
+                    <a16:rowId xmlns:a16="http://schemas.microsoft.com/office/drawing/2014/main" val="4002927652"/>
+                  </a:ext>
+                </a:extLst>
+              </a:tr>
+            </a:tbl>
+          </a:graphicData>
+        </a:graphic>
+      </p:graphicFrame>
+      <p:pic>
+        <p:nvPicPr>
+          <p:cNvPr id="5" name="Picture 4">
+            <a:extLst>
+              <a:ext uri="{FF2B5EF4-FFF2-40B4-BE49-F238E27FC236}">
+                <a16:creationId xmlns:a16="http://schemas.microsoft.com/office/drawing/2014/main" id="{D5371380-338D-4B87-8CAA-96462D85EDC7}"/>
+              </a:ext>
+            </a:extLst>
+          </p:cNvPr>
+          <p:cNvPicPr>
+            <a:picLocks noChangeAspect="1"/>
+          </p:cNvPicPr>
+          <p:nvPr/>
+        </p:nvPicPr>
+        <p:blipFill>
+          <a:blip r:embed="rId3"/>
+          <a:stretch>
+            <a:fillRect/>
+          </a:stretch>
+        </p:blipFill>
+        <p:spPr>
+          <a:xfrm>
+            <a:off x="4037012" y="2867605"/>
+            <a:ext cx="4114800" cy="2067670"/>
+          </a:xfrm>
+          <a:prstGeom prst="rect">
+            <a:avLst/>
+          </a:prstGeom>
+        </p:spPr>
+      </p:pic>
+    </p:spTree>
+    <p:extLst>
+      <p:ext uri="{BB962C8B-B14F-4D97-AF65-F5344CB8AC3E}">
+        <p14:creationId xmlns:p14="http://schemas.microsoft.com/office/powerpoint/2010/main" val="489519353"/>
+      </p:ext>
+    </p:extLst>
+  </p:cSld>
+  <p:clrMapOvr>
+    <a:masterClrMapping/>
+  </p:clrMapOvr>
+  <mc:AlternateContent xmlns:mc="http://schemas.openxmlformats.org/markup-compatibility/2006" xmlns:p14="http://schemas.microsoft.com/office/powerpoint/2010/main">
+    <mc:Choice Requires="p14">
+      <p:transition spd="med" p14:dur="700">
+        <p:fade/>
+      </p:transition>
+    </mc:Choice>
+    <mc:Fallback xmlns="">
+      <p:transition spd="med">
+        <p:fade/>
+      </p:transition>
+    </mc:Fallback>
+  </mc:AlternateContent>
+</p:sld>
+</file>
+
+<file path=ppt/slides/slide9.xml><?xml version="1.0" encoding="utf-8"?>
 <p:sld xmlns:a="http://schemas.openxmlformats.org/drawingml/2006/main" xmlns:r="http://schemas.openxmlformats.org/officeDocument/2006/relationships" xmlns:p="http://schemas.openxmlformats.org/presentationml/2006/main">
   <p:cSld>
     <p:spTree>
@@ -9239,133 +10676,6 @@
     <p:extLst>
       <p:ext uri="{BB962C8B-B14F-4D97-AF65-F5344CB8AC3E}">
         <p14:creationId xmlns:p14="http://schemas.microsoft.com/office/powerpoint/2010/main" val="1208515342"/>
-      </p:ext>
-    </p:extLst>
-  </p:cSld>
-  <p:clrMapOvr>
-    <a:masterClrMapping/>
-  </p:clrMapOvr>
-  <mc:AlternateContent xmlns:mc="http://schemas.openxmlformats.org/markup-compatibility/2006" xmlns:p14="http://schemas.microsoft.com/office/powerpoint/2010/main">
-    <mc:Choice Requires="p14">
-      <p:transition spd="med" p14:dur="700">
-        <p:fade/>
-      </p:transition>
-    </mc:Choice>
-    <mc:Fallback xmlns="">
-      <p:transition spd="med">
-        <p:fade/>
-      </p:transition>
-    </mc:Fallback>
-  </mc:AlternateContent>
-</p:sld>
-</file>
-
-<file path=ppt/slides/slide8.xml><?xml version="1.0" encoding="utf-8"?>
-<p:sld xmlns:a="http://schemas.openxmlformats.org/drawingml/2006/main" xmlns:r="http://schemas.openxmlformats.org/officeDocument/2006/relationships" xmlns:p="http://schemas.openxmlformats.org/presentationml/2006/main">
-  <p:cSld>
-    <p:spTree>
-      <p:nvGrpSpPr>
-        <p:cNvPr id="1" name=""/>
-        <p:cNvGrpSpPr/>
-        <p:nvPr/>
-      </p:nvGrpSpPr>
-      <p:grpSpPr>
-        <a:xfrm>
-          <a:off x="0" y="0"/>
-          <a:ext cx="0" cy="0"/>
-          <a:chOff x="0" y="0"/>
-          <a:chExt cx="0" cy="0"/>
-        </a:xfrm>
-      </p:grpSpPr>
-      <p:sp>
-        <p:nvSpPr>
-          <p:cNvPr id="2" name="Title 1"/>
-          <p:cNvSpPr>
-            <a:spLocks noGrp="1"/>
-          </p:cNvSpPr>
-          <p:nvPr>
-            <p:ph type="title"/>
-          </p:nvPr>
-        </p:nvSpPr>
-        <p:spPr/>
-        <p:txBody>
-          <a:bodyPr/>
-          <a:lstStyle/>
-          <a:p>
-            <a:r>
-              <a:rPr lang="en-US" dirty="0"/>
-              <a:t>Appendix: Dataflow Detailed</a:t>
-            </a:r>
-          </a:p>
-        </p:txBody>
-      </p:sp>
-      <p:graphicFrame>
-        <p:nvGraphicFramePr>
-          <p:cNvPr id="3" name="Object 2">
-            <a:extLst>
-              <a:ext uri="{FF2B5EF4-FFF2-40B4-BE49-F238E27FC236}">
-                <a16:creationId xmlns:a16="http://schemas.microsoft.com/office/drawing/2014/main" id="{1ECAC440-933B-4372-8A66-AFCD2805CC30}"/>
-              </a:ext>
-            </a:extLst>
-          </p:cNvPr>
-          <p:cNvGraphicFramePr>
-            <a:graphicFrameLocks noChangeAspect="1"/>
-          </p:cNvGraphicFramePr>
-          <p:nvPr>
-            <p:extLst>
-              <p:ext uri="{D42A27DB-BD31-4B8C-83A1-F6EECF244321}">
-                <p14:modId xmlns:p14="http://schemas.microsoft.com/office/powerpoint/2010/main" val="974402487"/>
-              </p:ext>
-            </p:extLst>
-          </p:nvPr>
-        </p:nvGraphicFramePr>
-        <p:xfrm>
-          <a:off x="1638300" y="1474788"/>
-          <a:ext cx="8912225" cy="4927600"/>
-        </p:xfrm>
-        <a:graphic>
-          <a:graphicData uri="http://schemas.openxmlformats.org/presentationml/2006/ole">
-            <mc:AlternateContent xmlns:mc="http://schemas.openxmlformats.org/markup-compatibility/2006">
-              <mc:Choice xmlns:v="urn:schemas-microsoft-com:vml" Requires="v">
-                <p:oleObj spid="_x0000_s1037" name="Visio" r:id="rId3" imgW="11308655" imgH="6252807" progId="Visio.Drawing.11">
-                  <p:embed/>
-                </p:oleObj>
-              </mc:Choice>
-              <mc:Fallback>
-                <p:oleObj name="Visio" r:id="rId3" imgW="11308655" imgH="6252807" progId="Visio.Drawing.11">
-                  <p:embed/>
-                  <p:pic>
-                    <p:nvPicPr>
-                      <p:cNvPr id="0" name=""/>
-                      <p:cNvPicPr/>
-                      <p:nvPr/>
-                    </p:nvPicPr>
-                    <p:blipFill>
-                      <a:blip r:embed="rId4"/>
-                      <a:stretch>
-                        <a:fillRect/>
-                      </a:stretch>
-                    </p:blipFill>
-                    <p:spPr>
-                      <a:xfrm>
-                        <a:off x="1638300" y="1474788"/>
-                        <a:ext cx="8912225" cy="4927600"/>
-                      </a:xfrm>
-                      <a:prstGeom prst="rect">
-                        <a:avLst/>
-                      </a:prstGeom>
-                    </p:spPr>
-                  </p:pic>
-                </p:oleObj>
-              </mc:Fallback>
-            </mc:AlternateContent>
-          </a:graphicData>
-        </a:graphic>
-      </p:graphicFrame>
-    </p:spTree>
-    <p:extLst>
-      <p:ext uri="{BB962C8B-B14F-4D97-AF65-F5344CB8AC3E}">
-        <p14:creationId xmlns:p14="http://schemas.microsoft.com/office/powerpoint/2010/main" val="427281834"/>
       </p:ext>
     </p:extLst>
   </p:cSld>

</xml_diff>